<commit_message>
Updating stuff in powerpoint
</commit_message>
<xml_diff>
--- a/docs/CraftDemo.pptx
+++ b/docs/CraftDemo.pptx
@@ -4636,22 +4636,14 @@
             <a:pPr lvl="1"/>
             <a:r>
               <a:rPr lang="en-US" dirty="0" smtClean="0"/>
-              <a:t>Love to </a:t>
-            </a:r>
-            <a:r>
-              <a:rPr lang="en-US" dirty="0" smtClean="0"/>
-              <a:t>Travel, Take Photos &amp; Swim</a:t>
+              <a:t>Love to Travel, Take Photos &amp; Swim</a:t>
             </a:r>
           </a:p>
           <a:p>
             <a:pPr lvl="1"/>
             <a:r>
               <a:rPr lang="en-US" dirty="0" smtClean="0"/>
-              <a:t>Some </a:t>
-            </a:r>
-            <a:r>
-              <a:rPr lang="en-US" dirty="0" smtClean="0"/>
-              <a:t>of my photography work here: </a:t>
+              <a:t>Some of my photography work here: </a:t>
             </a:r>
             <a:r>
               <a:rPr lang="en-US" dirty="0" smtClean="0">
@@ -4916,7 +4908,11 @@
           <a:p>
             <a:r>
               <a:rPr lang="en-US" dirty="0" smtClean="0"/>
-              <a:t>In-Store foot traffic </a:t>
+              <a:t>Customer </a:t>
+            </a:r>
+            <a:r>
+              <a:rPr lang="en-US" dirty="0" smtClean="0"/>
+              <a:t>traffic </a:t>
             </a:r>
             <a:r>
               <a:rPr lang="en-US" dirty="0" err="1" smtClean="0"/>
@@ -4926,46 +4922,6 @@
               <a:rPr lang="en-US" dirty="0" smtClean="0"/>
               <a:t> @ Gap Inc.</a:t>
             </a:r>
-          </a:p>
-          <a:p>
-            <a:pPr marL="742950" lvl="2" indent="-342900"/>
-            <a:r>
-              <a:rPr lang="en-US" b="1" dirty="0" smtClean="0"/>
-              <a:t>Use-case</a:t>
-            </a:r>
-            <a:r>
-              <a:rPr lang="en-US" dirty="0" smtClean="0"/>
-              <a:t>: </a:t>
-            </a:r>
-            <a:r>
-              <a:rPr lang="en-US" dirty="0" err="1" smtClean="0"/>
-              <a:t>PoC</a:t>
-            </a:r>
-            <a:r>
-              <a:rPr lang="en-US" dirty="0" smtClean="0"/>
-              <a:t> for crunching network data in </a:t>
-            </a:r>
-            <a:r>
-              <a:rPr lang="en-US" dirty="0" err="1" smtClean="0"/>
-              <a:t>Elasticsearch</a:t>
-            </a:r>
-            <a:r>
-              <a:rPr lang="en-US" dirty="0" smtClean="0"/>
-              <a:t> and superimposing on </a:t>
-            </a:r>
-            <a:r>
-              <a:rPr lang="en-US" dirty="0" err="1" smtClean="0"/>
-              <a:t>google</a:t>
-            </a:r>
-            <a:r>
-              <a:rPr lang="en-US" dirty="0" smtClean="0"/>
-              <a:t> maps specific to that store, to show customer foot traffic as </a:t>
-            </a:r>
-            <a:r>
-              <a:rPr lang="en-US" dirty="0" err="1" smtClean="0"/>
-              <a:t>heatmap</a:t>
-            </a:r>
-            <a:endParaRPr lang="en-US" dirty="0" smtClean="0"/>
           </a:p>
           <a:p>
             <a:pPr marL="742950" lvl="2" indent="-342900"/>

</xml_diff>

<commit_message>
Updating ppt Minor mistakes
</commit_message>
<xml_diff>
--- a/docs/CraftDemo.pptx
+++ b/docs/CraftDemo.pptx
@@ -307,7 +307,7 @@
           <a:p>
             <a:fld id="{1CACB8EB-0FB9-3D49-8B9A-8B6F29042578}" type="datetimeFigureOut">
               <a:rPr lang="en-US" smtClean="0"/>
-              <a:t>6/5/16</a:t>
+              <a:t>6/6/16</a:t>
             </a:fld>
             <a:endParaRPr lang="en-US"/>
           </a:p>
@@ -477,7 +477,7 @@
           <a:p>
             <a:fld id="{1CACB8EB-0FB9-3D49-8B9A-8B6F29042578}" type="datetimeFigureOut">
               <a:rPr lang="en-US" smtClean="0"/>
-              <a:t>6/5/16</a:t>
+              <a:t>6/6/16</a:t>
             </a:fld>
             <a:endParaRPr lang="en-US"/>
           </a:p>
@@ -657,7 +657,7 @@
           <a:p>
             <a:fld id="{1CACB8EB-0FB9-3D49-8B9A-8B6F29042578}" type="datetimeFigureOut">
               <a:rPr lang="en-US" smtClean="0"/>
-              <a:t>6/5/16</a:t>
+              <a:t>6/6/16</a:t>
             </a:fld>
             <a:endParaRPr lang="en-US"/>
           </a:p>
@@ -827,7 +827,7 @@
           <a:p>
             <a:fld id="{1CACB8EB-0FB9-3D49-8B9A-8B6F29042578}" type="datetimeFigureOut">
               <a:rPr lang="en-US" smtClean="0"/>
-              <a:t>6/5/16</a:t>
+              <a:t>6/6/16</a:t>
             </a:fld>
             <a:endParaRPr lang="en-US"/>
           </a:p>
@@ -1073,7 +1073,7 @@
           <a:p>
             <a:fld id="{1CACB8EB-0FB9-3D49-8B9A-8B6F29042578}" type="datetimeFigureOut">
               <a:rPr lang="en-US" smtClean="0"/>
-              <a:t>6/5/16</a:t>
+              <a:t>6/6/16</a:t>
             </a:fld>
             <a:endParaRPr lang="en-US"/>
           </a:p>
@@ -1361,7 +1361,7 @@
           <a:p>
             <a:fld id="{1CACB8EB-0FB9-3D49-8B9A-8B6F29042578}" type="datetimeFigureOut">
               <a:rPr lang="en-US" smtClean="0"/>
-              <a:t>6/5/16</a:t>
+              <a:t>6/6/16</a:t>
             </a:fld>
             <a:endParaRPr lang="en-US"/>
           </a:p>
@@ -1783,7 +1783,7 @@
           <a:p>
             <a:fld id="{1CACB8EB-0FB9-3D49-8B9A-8B6F29042578}" type="datetimeFigureOut">
               <a:rPr lang="en-US" smtClean="0"/>
-              <a:t>6/5/16</a:t>
+              <a:t>6/6/16</a:t>
             </a:fld>
             <a:endParaRPr lang="en-US"/>
           </a:p>
@@ -1901,7 +1901,7 @@
           <a:p>
             <a:fld id="{1CACB8EB-0FB9-3D49-8B9A-8B6F29042578}" type="datetimeFigureOut">
               <a:rPr lang="en-US" smtClean="0"/>
-              <a:t>6/5/16</a:t>
+              <a:t>6/6/16</a:t>
             </a:fld>
             <a:endParaRPr lang="en-US"/>
           </a:p>
@@ -1996,7 +1996,7 @@
           <a:p>
             <a:fld id="{1CACB8EB-0FB9-3D49-8B9A-8B6F29042578}" type="datetimeFigureOut">
               <a:rPr lang="en-US" smtClean="0"/>
-              <a:t>6/5/16</a:t>
+              <a:t>6/6/16</a:t>
             </a:fld>
             <a:endParaRPr lang="en-US"/>
           </a:p>
@@ -2273,7 +2273,7 @@
           <a:p>
             <a:fld id="{1CACB8EB-0FB9-3D49-8B9A-8B6F29042578}" type="datetimeFigureOut">
               <a:rPr lang="en-US" smtClean="0"/>
-              <a:t>6/5/16</a:t>
+              <a:t>6/6/16</a:t>
             </a:fld>
             <a:endParaRPr lang="en-US"/>
           </a:p>
@@ -2526,7 +2526,7 @@
           <a:p>
             <a:fld id="{1CACB8EB-0FB9-3D49-8B9A-8B6F29042578}" type="datetimeFigureOut">
               <a:rPr lang="en-US" smtClean="0"/>
-              <a:t>6/5/16</a:t>
+              <a:t>6/6/16</a:t>
             </a:fld>
             <a:endParaRPr lang="en-US"/>
           </a:p>
@@ -2739,7 +2739,7 @@
           <a:p>
             <a:fld id="{1CACB8EB-0FB9-3D49-8B9A-8B6F29042578}" type="datetimeFigureOut">
               <a:rPr lang="en-US" smtClean="0"/>
-              <a:t>6/5/16</a:t>
+              <a:t>6/6/16</a:t>
             </a:fld>
             <a:endParaRPr lang="en-US"/>
           </a:p>
@@ -3215,9 +3215,202 @@
           </a:p>
         </p:txBody>
       </p:sp>
+      <p:sp>
+        <p:nvSpPr>
+          <p:cNvPr id="6" name="TextBox 5"/>
+          <p:cNvSpPr txBox="1"/>
+          <p:nvPr/>
+        </p:nvSpPr>
+        <p:spPr>
+          <a:xfrm>
+            <a:off x="917857" y="2690130"/>
+            <a:ext cx="7305141" cy="3970318"/>
+          </a:xfrm>
+          <a:prstGeom prst="rect">
+            <a:avLst/>
+          </a:prstGeom>
+          <a:noFill/>
+        </p:spPr>
+        <p:txBody>
+          <a:bodyPr wrap="square" rtlCol="0">
+            <a:spAutoFit/>
+          </a:bodyPr>
+          <a:lstStyle/>
+          <a:p>
+            <a:endParaRPr lang="en-US" dirty="0" smtClean="0"/>
+          </a:p>
+          <a:p>
+            <a:r>
+              <a:rPr lang="en-US" dirty="0" smtClean="0"/>
+              <a:t>Create </a:t>
+            </a:r>
+            <a:r>
+              <a:rPr lang="en-US" dirty="0"/>
+              <a:t>graph: </a:t>
+            </a:r>
+            <a:br>
+              <a:rPr lang="en-US" dirty="0"/>
+            </a:br>
+            <a:r>
+              <a:rPr lang="en-US" dirty="0"/>
+              <a:t>create (</a:t>
+            </a:r>
+            <a:r>
+              <a:rPr lang="en-US" dirty="0" err="1"/>
+              <a:t>Shivang:Employee</a:t>
+            </a:r>
+            <a:r>
+              <a:rPr lang="en-US" dirty="0"/>
+              <a:t> {</a:t>
+            </a:r>
+            <a:r>
+              <a:rPr lang="en-US" dirty="0" err="1"/>
+              <a:t>name:'Shivang</a:t>
+            </a:r>
+            <a:r>
+              <a:rPr lang="en-US" dirty="0"/>
+              <a:t>'}), (</a:t>
+            </a:r>
+            <a:r>
+              <a:rPr lang="en-US" dirty="0" err="1"/>
+              <a:t>John:Employee</a:t>
+            </a:r>
+            <a:r>
+              <a:rPr lang="en-US" dirty="0"/>
+              <a:t> {name: 'John'}), (</a:t>
+            </a:r>
+            <a:r>
+              <a:rPr lang="en-US" dirty="0" err="1"/>
+              <a:t>Jack:Employee</a:t>
+            </a:r>
+            <a:r>
+              <a:rPr lang="en-US" dirty="0"/>
+              <a:t> {name: 'Jack'}), (Shivang)-[:FOLLOWS]-&gt;(John), (Shivang)-[:FOLLOWS]-&gt;(Jack), (Shivang)&lt;-[:FOLLOWS]-(John), (John)-[:FOLLOWS]-&gt;(Jack</a:t>
+            </a:r>
+            <a:r>
+              <a:rPr lang="en-US" dirty="0" smtClean="0"/>
+              <a:t>)</a:t>
+            </a:r>
+          </a:p>
+          <a:p>
+            <a:endParaRPr lang="en-US" dirty="0" smtClean="0"/>
+          </a:p>
+          <a:p>
+            <a:r>
+              <a:rPr lang="en-US" dirty="0"/>
+              <a:t>Query followings:</a:t>
+            </a:r>
+            <a:br>
+              <a:rPr lang="en-US" dirty="0"/>
+            </a:br>
+            <a:r>
+              <a:rPr lang="en-US" dirty="0"/>
+              <a:t>match (</a:t>
+            </a:r>
+            <a:r>
+              <a:rPr lang="en-US" dirty="0" err="1"/>
+              <a:t>n:Employee</a:t>
+            </a:r>
+            <a:r>
+              <a:rPr lang="en-US" dirty="0"/>
+              <a:t>)-[:FOLLOWS]-&gt;(followings) where </a:t>
+            </a:r>
+            <a:r>
+              <a:rPr lang="en-US" dirty="0" err="1"/>
+              <a:t>n.name</a:t>
+            </a:r>
+            <a:r>
+              <a:rPr lang="en-US" dirty="0"/>
+              <a:t>='Shivang' return n as Shivang, followings </a:t>
+            </a:r>
+            <a:endParaRPr lang="en-US" dirty="0" smtClean="0"/>
+          </a:p>
+          <a:p>
+            <a:endParaRPr lang="en-US" dirty="0" smtClean="0"/>
+          </a:p>
+          <a:p>
+            <a:r>
+              <a:rPr lang="en-US" dirty="0" smtClean="0"/>
+              <a:t>Query followers</a:t>
+            </a:r>
+            <a:r>
+              <a:rPr lang="en-US" dirty="0" smtClean="0"/>
+              <a:t>:</a:t>
+            </a:r>
+            <a:endParaRPr lang="en-US" dirty="0"/>
+          </a:p>
+          <a:p>
+            <a:r>
+              <a:rPr lang="en-US" dirty="0"/>
+              <a:t>match (followers)-[:FOLLOWS]-&gt;(</a:t>
+            </a:r>
+            <a:r>
+              <a:rPr lang="en-US" dirty="0" err="1"/>
+              <a:t>n:Employee</a:t>
+            </a:r>
+            <a:r>
+              <a:rPr lang="en-US" dirty="0"/>
+              <a:t>) where </a:t>
+            </a:r>
+            <a:r>
+              <a:rPr lang="en-US" dirty="0" err="1"/>
+              <a:t>n.name</a:t>
+            </a:r>
+            <a:r>
+              <a:rPr lang="en-US" dirty="0"/>
+              <a:t>='Shivang' return n as Shivang, followers</a:t>
+            </a:r>
+            <a:endParaRPr lang="en-US" dirty="0" smtClean="0"/>
+          </a:p>
+        </p:txBody>
+      </p:sp>
+      <p:sp>
+        <p:nvSpPr>
+          <p:cNvPr id="8" name="TextBox 7"/>
+          <p:cNvSpPr txBox="1"/>
+          <p:nvPr/>
+        </p:nvSpPr>
+        <p:spPr>
+          <a:xfrm>
+            <a:off x="4667872" y="1758854"/>
+            <a:ext cx="4765316" cy="646331"/>
+          </a:xfrm>
+          <a:prstGeom prst="rect">
+            <a:avLst/>
+          </a:prstGeom>
+          <a:noFill/>
+        </p:spPr>
+        <p:txBody>
+          <a:bodyPr wrap="square" rtlCol="0">
+            <a:spAutoFit/>
+          </a:bodyPr>
+          <a:lstStyle/>
+          <a:p>
+            <a:pPr marL="285750" indent="-285750">
+              <a:buFont typeface="Arial"/>
+              <a:buChar char="•"/>
+            </a:pPr>
+            <a:r>
+              <a:rPr lang="en-US" dirty="0" smtClean="0"/>
+              <a:t>Fundamental Graph Problem</a:t>
+            </a:r>
+          </a:p>
+          <a:p>
+            <a:pPr marL="285750" indent="-285750">
+              <a:buFont typeface="Arial"/>
+              <a:buChar char="•"/>
+            </a:pPr>
+            <a:r>
+              <a:rPr lang="en-US" dirty="0" smtClean="0"/>
+              <a:t>Bi-directional “Follows” relationship graph</a:t>
+            </a:r>
+            <a:endParaRPr lang="en-US" dirty="0"/>
+          </a:p>
+        </p:txBody>
+      </p:sp>
       <p:pic>
         <p:nvPicPr>
-          <p:cNvPr id="4" name="Picture 3"/>
+          <p:cNvPr id="3" name="Picture 2"/>
           <p:cNvPicPr>
             <a:picLocks noChangeAspect="1"/>
           </p:cNvPicPr>
@@ -3231,197 +3424,14 @@
         </p:blipFill>
         <p:spPr>
           <a:xfrm>
-            <a:off x="457200" y="1358901"/>
-            <a:ext cx="2434680" cy="1595304"/>
+            <a:off x="917857" y="1258550"/>
+            <a:ext cx="2954748" cy="1711203"/>
           </a:xfrm>
           <a:prstGeom prst="rect">
             <a:avLst/>
           </a:prstGeom>
         </p:spPr>
       </p:pic>
-      <p:sp>
-        <p:nvSpPr>
-          <p:cNvPr id="6" name="TextBox 5"/>
-          <p:cNvSpPr txBox="1"/>
-          <p:nvPr/>
-        </p:nvSpPr>
-        <p:spPr>
-          <a:xfrm>
-            <a:off x="917857" y="2954205"/>
-            <a:ext cx="7305141" cy="3970318"/>
-          </a:xfrm>
-          <a:prstGeom prst="rect">
-            <a:avLst/>
-          </a:prstGeom>
-          <a:noFill/>
-        </p:spPr>
-        <p:txBody>
-          <a:bodyPr wrap="square" rtlCol="0">
-            <a:spAutoFit/>
-          </a:bodyPr>
-          <a:lstStyle/>
-          <a:p>
-            <a:r>
-              <a:rPr lang="en-US" dirty="0"/>
-              <a:t>Create graph: </a:t>
-            </a:r>
-            <a:br>
-              <a:rPr lang="en-US" dirty="0"/>
-            </a:br>
-            <a:r>
-              <a:rPr lang="en-US" dirty="0"/>
-              <a:t>create (</a:t>
-            </a:r>
-            <a:r>
-              <a:rPr lang="en-US" dirty="0" err="1"/>
-              <a:t>Shivang:Employee</a:t>
-            </a:r>
-            <a:r>
-              <a:rPr lang="en-US" dirty="0"/>
-              <a:t> {</a:t>
-            </a:r>
-            <a:r>
-              <a:rPr lang="en-US" dirty="0" err="1"/>
-              <a:t>name:'Shivang</a:t>
-            </a:r>
-            <a:r>
-              <a:rPr lang="en-US" dirty="0"/>
-              <a:t>'}), (</a:t>
-            </a:r>
-            <a:r>
-              <a:rPr lang="en-US" dirty="0" err="1"/>
-              <a:t>John:Employee</a:t>
-            </a:r>
-            <a:r>
-              <a:rPr lang="en-US" dirty="0"/>
-              <a:t> {name: 'John'}), (</a:t>
-            </a:r>
-            <a:r>
-              <a:rPr lang="en-US" dirty="0" err="1"/>
-              <a:t>Jack:Employee</a:t>
-            </a:r>
-            <a:r>
-              <a:rPr lang="en-US" dirty="0"/>
-              <a:t> {name: 'Jack'}), (Shivang)-[:FOLLOWS]-&gt;(John), (Shivang)-[:FOLLOWS]-&gt;(Jack), (Shivang)&lt;-[:FOLLOWS]-(John), (John)-[:FOLLOWS]-&gt;(Jack</a:t>
-            </a:r>
-            <a:r>
-              <a:rPr lang="en-US" dirty="0" smtClean="0"/>
-              <a:t>)</a:t>
-            </a:r>
-          </a:p>
-          <a:p>
-            <a:endParaRPr lang="en-US" dirty="0" smtClean="0"/>
-          </a:p>
-          <a:p>
-            <a:r>
-              <a:rPr lang="en-US" dirty="0"/>
-              <a:t>Query followings:</a:t>
-            </a:r>
-            <a:br>
-              <a:rPr lang="en-US" dirty="0"/>
-            </a:br>
-            <a:r>
-              <a:rPr lang="en-US" dirty="0"/>
-              <a:t>match (</a:t>
-            </a:r>
-            <a:r>
-              <a:rPr lang="en-US" dirty="0" err="1"/>
-              <a:t>n:Employee</a:t>
-            </a:r>
-            <a:r>
-              <a:rPr lang="en-US" dirty="0"/>
-              <a:t>)-[:FOLLOWS]-&gt;(followings) where </a:t>
-            </a:r>
-            <a:r>
-              <a:rPr lang="en-US" dirty="0" err="1"/>
-              <a:t>n.name</a:t>
-            </a:r>
-            <a:r>
-              <a:rPr lang="en-US" dirty="0"/>
-              <a:t>='Shivang' return n as Shivang, followings </a:t>
-            </a:r>
-            <a:endParaRPr lang="en-US" dirty="0" smtClean="0"/>
-          </a:p>
-          <a:p>
-            <a:endParaRPr lang="en-US" dirty="0" smtClean="0"/>
-          </a:p>
-          <a:p>
-            <a:r>
-              <a:rPr lang="en-US" dirty="0" smtClean="0"/>
-              <a:t>Query followers:</a:t>
-            </a:r>
-          </a:p>
-          <a:p>
-            <a:r>
-              <a:rPr lang="en-US" dirty="0"/>
-              <a:t>match (</a:t>
-            </a:r>
-            <a:r>
-              <a:rPr lang="en-US" dirty="0" err="1"/>
-              <a:t>n:Employee</a:t>
-            </a:r>
-            <a:r>
-              <a:rPr lang="en-US" dirty="0"/>
-              <a:t>)-[:FOLLOWS]-&gt;(followings) where </a:t>
-            </a:r>
-            <a:r>
-              <a:rPr lang="en-US" dirty="0" err="1"/>
-              <a:t>n.name</a:t>
-            </a:r>
-            <a:r>
-              <a:rPr lang="en-US" dirty="0"/>
-              <a:t>='Shivang' return n as Shivang, followings</a:t>
-            </a:r>
-          </a:p>
-          <a:p>
-            <a:endParaRPr lang="en-US" dirty="0"/>
-          </a:p>
-        </p:txBody>
-      </p:sp>
-      <p:sp>
-        <p:nvSpPr>
-          <p:cNvPr id="8" name="TextBox 7"/>
-          <p:cNvSpPr txBox="1"/>
-          <p:nvPr/>
-        </p:nvSpPr>
-        <p:spPr>
-          <a:xfrm>
-            <a:off x="3105628" y="1740803"/>
-            <a:ext cx="4765316" cy="646331"/>
-          </a:xfrm>
-          <a:prstGeom prst="rect">
-            <a:avLst/>
-          </a:prstGeom>
-          <a:noFill/>
-        </p:spPr>
-        <p:txBody>
-          <a:bodyPr wrap="square" rtlCol="0">
-            <a:spAutoFit/>
-          </a:bodyPr>
-          <a:lstStyle/>
-          <a:p>
-            <a:pPr marL="285750" indent="-285750">
-              <a:buFont typeface="Arial"/>
-              <a:buChar char="•"/>
-            </a:pPr>
-            <a:r>
-              <a:rPr lang="en-US" dirty="0" smtClean="0"/>
-              <a:t>Fundamental Graph Problem</a:t>
-            </a:r>
-          </a:p>
-          <a:p>
-            <a:pPr marL="285750" indent="-285750">
-              <a:buFont typeface="Arial"/>
-              <a:buChar char="•"/>
-            </a:pPr>
-            <a:r>
-              <a:rPr lang="en-US" dirty="0" smtClean="0"/>
-              <a:t>Bi-directional “Follows” relationship graph</a:t>
-            </a:r>
-            <a:endParaRPr lang="en-US" dirty="0"/>
-          </a:p>
-        </p:txBody>
-      </p:sp>
     </p:spTree>
     <p:extLst>
       <p:ext uri="{BB962C8B-B14F-4D97-AF65-F5344CB8AC3E}">
@@ -3461,7 +3471,7 @@
       </p:grpSpPr>
       <p:pic>
         <p:nvPicPr>
-          <p:cNvPr id="4" name="Picture 3"/>
+          <p:cNvPr id="2" name="Picture 1"/>
           <p:cNvPicPr>
             <a:picLocks noChangeAspect="1"/>
           </p:cNvPicPr>
@@ -3475,8 +3485,8 @@
         </p:blipFill>
         <p:spPr>
           <a:xfrm>
-            <a:off x="595507" y="460143"/>
-            <a:ext cx="3302246" cy="2163769"/>
+            <a:off x="0" y="20650"/>
+            <a:ext cx="9144000" cy="3126390"/>
           </a:xfrm>
           <a:prstGeom prst="rect">
             <a:avLst/>
@@ -3485,7 +3495,7 @@
       </p:pic>
       <p:pic>
         <p:nvPicPr>
-          <p:cNvPr id="5" name="Picture 4"/>
+          <p:cNvPr id="3" name="Picture 2"/>
           <p:cNvPicPr>
             <a:picLocks noChangeAspect="1"/>
           </p:cNvPicPr>
@@ -3499,32 +3509,8 @@
         </p:blipFill>
         <p:spPr>
           <a:xfrm>
-            <a:off x="0" y="2525048"/>
-            <a:ext cx="9144000" cy="2248930"/>
-          </a:xfrm>
-          <a:prstGeom prst="rect">
-            <a:avLst/>
-          </a:prstGeom>
-        </p:spPr>
-      </p:pic>
-      <p:pic>
-        <p:nvPicPr>
-          <p:cNvPr id="8" name="Picture 7"/>
-          <p:cNvPicPr>
-            <a:picLocks noChangeAspect="1"/>
-          </p:cNvPicPr>
-          <p:nvPr/>
-        </p:nvPicPr>
-        <p:blipFill>
-          <a:blip r:embed="rId4"/>
-          <a:stretch>
-            <a:fillRect/>
-          </a:stretch>
-        </p:blipFill>
-        <p:spPr>
-          <a:xfrm>
-            <a:off x="0" y="4879921"/>
-            <a:ext cx="9144000" cy="1571050"/>
+            <a:off x="0" y="3147040"/>
+            <a:ext cx="9144000" cy="3710960"/>
           </a:xfrm>
           <a:prstGeom prst="rect">
             <a:avLst/>
@@ -4908,11 +4894,7 @@
           <a:p>
             <a:r>
               <a:rPr lang="en-US" dirty="0" smtClean="0"/>
-              <a:t>Customer </a:t>
-            </a:r>
-            <a:r>
-              <a:rPr lang="en-US" dirty="0" smtClean="0"/>
-              <a:t>traffic </a:t>
+              <a:t>Customer traffic </a:t>
             </a:r>
             <a:r>
               <a:rPr lang="en-US" dirty="0" err="1" smtClean="0"/>

</xml_diff>